<commit_message>
12:32 bank walls och fixade radio help
</commit_message>
<xml_diff>
--- a/Mittredovisningen.pptx
+++ b/Mittredovisningen.pptx
@@ -307,7 +307,7 @@
           <a:p>
             <a:fld id="{7316E94A-75CA-415A-8975-51788012BAF6}" type="datetimeFigureOut">
               <a:rPr lang="sv-SE" smtClean="0"/>
-              <a:t>2013-02-21</a:t>
+              <a:t>2013-03-04</a:t>
             </a:fld>
             <a:endParaRPr lang="sv-SE"/>
           </a:p>
@@ -477,7 +477,7 @@
           <a:p>
             <a:fld id="{7316E94A-75CA-415A-8975-51788012BAF6}" type="datetimeFigureOut">
               <a:rPr lang="sv-SE" smtClean="0"/>
-              <a:t>2013-02-21</a:t>
+              <a:t>2013-03-04</a:t>
             </a:fld>
             <a:endParaRPr lang="sv-SE"/>
           </a:p>
@@ -657,7 +657,7 @@
           <a:p>
             <a:fld id="{7316E94A-75CA-415A-8975-51788012BAF6}" type="datetimeFigureOut">
               <a:rPr lang="sv-SE" smtClean="0"/>
-              <a:t>2013-02-21</a:t>
+              <a:t>2013-03-04</a:t>
             </a:fld>
             <a:endParaRPr lang="sv-SE"/>
           </a:p>
@@ -827,7 +827,7 @@
           <a:p>
             <a:fld id="{7316E94A-75CA-415A-8975-51788012BAF6}" type="datetimeFigureOut">
               <a:rPr lang="sv-SE" smtClean="0"/>
-              <a:t>2013-02-21</a:t>
+              <a:t>2013-03-04</a:t>
             </a:fld>
             <a:endParaRPr lang="sv-SE"/>
           </a:p>
@@ -1073,7 +1073,7 @@
           <a:p>
             <a:fld id="{7316E94A-75CA-415A-8975-51788012BAF6}" type="datetimeFigureOut">
               <a:rPr lang="sv-SE" smtClean="0"/>
-              <a:t>2013-02-21</a:t>
+              <a:t>2013-03-04</a:t>
             </a:fld>
             <a:endParaRPr lang="sv-SE"/>
           </a:p>
@@ -1361,7 +1361,7 @@
           <a:p>
             <a:fld id="{7316E94A-75CA-415A-8975-51788012BAF6}" type="datetimeFigureOut">
               <a:rPr lang="sv-SE" smtClean="0"/>
-              <a:t>2013-02-21</a:t>
+              <a:t>2013-03-04</a:t>
             </a:fld>
             <a:endParaRPr lang="sv-SE"/>
           </a:p>
@@ -1783,7 +1783,7 @@
           <a:p>
             <a:fld id="{7316E94A-75CA-415A-8975-51788012BAF6}" type="datetimeFigureOut">
               <a:rPr lang="sv-SE" smtClean="0"/>
-              <a:t>2013-02-21</a:t>
+              <a:t>2013-03-04</a:t>
             </a:fld>
             <a:endParaRPr lang="sv-SE"/>
           </a:p>
@@ -1901,7 +1901,7 @@
           <a:p>
             <a:fld id="{7316E94A-75CA-415A-8975-51788012BAF6}" type="datetimeFigureOut">
               <a:rPr lang="sv-SE" smtClean="0"/>
-              <a:t>2013-02-21</a:t>
+              <a:t>2013-03-04</a:t>
             </a:fld>
             <a:endParaRPr lang="sv-SE"/>
           </a:p>
@@ -1996,7 +1996,7 @@
           <a:p>
             <a:fld id="{7316E94A-75CA-415A-8975-51788012BAF6}" type="datetimeFigureOut">
               <a:rPr lang="sv-SE" smtClean="0"/>
-              <a:t>2013-02-21</a:t>
+              <a:t>2013-03-04</a:t>
             </a:fld>
             <a:endParaRPr lang="sv-SE"/>
           </a:p>
@@ -2273,7 +2273,7 @@
           <a:p>
             <a:fld id="{7316E94A-75CA-415A-8975-51788012BAF6}" type="datetimeFigureOut">
               <a:rPr lang="sv-SE" smtClean="0"/>
-              <a:t>2013-02-21</a:t>
+              <a:t>2013-03-04</a:t>
             </a:fld>
             <a:endParaRPr lang="sv-SE"/>
           </a:p>
@@ -2526,7 +2526,7 @@
           <a:p>
             <a:fld id="{7316E94A-75CA-415A-8975-51788012BAF6}" type="datetimeFigureOut">
               <a:rPr lang="sv-SE" smtClean="0"/>
-              <a:t>2013-02-21</a:t>
+              <a:t>2013-03-04</a:t>
             </a:fld>
             <a:endParaRPr lang="sv-SE"/>
           </a:p>
@@ -2742,7 +2742,7 @@
           <a:p>
             <a:fld id="{7316E94A-75CA-415A-8975-51788012BAF6}" type="datetimeFigureOut">
               <a:rPr lang="sv-SE" smtClean="0"/>
-              <a:t>2013-02-21</a:t>
+              <a:t>2013-03-04</a:t>
             </a:fld>
             <a:endParaRPr lang="sv-SE"/>
           </a:p>
@@ -3798,7 +3798,7 @@
         </p:blipFill>
         <p:spPr bwMode="auto">
           <a:xfrm>
-            <a:off x="289712" y="692696"/>
+            <a:off x="289712" y="702262"/>
             <a:ext cx="8532946" cy="5688631"/>
           </a:xfrm>
           <a:prstGeom prst="rect">

</xml_diff>